<commit_message>
Updated slides and gif
</commit_message>
<xml_diff>
--- a/_docs/GitOps.pptx
+++ b/_docs/GitOps.pptx
@@ -4908,7 +4908,7 @@
           </p:blipFill>
           <p:spPr>
             <a:xfrm>
-              <a:off x="4175972" y="3243801"/>
+              <a:off x="3471114" y="3243801"/>
               <a:ext cx="378514" cy="378514"/>
             </a:xfrm>
             <a:prstGeom prst="rect">
@@ -4954,10 +4954,10 @@
         </p:pic>
         <p:sp>
           <p:nvSpPr>
-            <p:cNvPr id="106" name="Rectangle 105">
+            <p:cNvPr id="110" name="Rectangle 109">
               <a:extLst>
                 <a:ext uri="{FF2B5EF4-FFF2-40B4-BE49-F238E27FC236}">
-                  <a16:creationId xmlns:a16="http://schemas.microsoft.com/office/drawing/2014/main" id="{D533D521-12B1-324F-BCD4-6F5EB7A04ACD}"/>
+                  <a16:creationId xmlns:a16="http://schemas.microsoft.com/office/drawing/2014/main" id="{4A1AB322-280C-F040-9565-9EE53263891F}"/>
                 </a:ext>
               </a:extLst>
             </p:cNvPr>
@@ -4966,8 +4966,8 @@
           </p:nvSpPr>
           <p:spPr>
             <a:xfrm>
-              <a:off x="3286430" y="2637050"/>
-              <a:ext cx="697627" cy="646331"/>
+              <a:off x="3683529" y="3654303"/>
+              <a:ext cx="492443" cy="261610"/>
             </a:xfrm>
             <a:prstGeom prst="rect">
               <a:avLst/>
@@ -4981,192 +4981,15 @@
             <a:p>
               <a:pPr algn="ctr"/>
               <a:r>
-                <a:rPr lang="en-US" sz="900" b="1" dirty="0">
-                  <a:latin typeface="Segoe UI Semibold" panose="020B0502040204020203" pitchFamily="34" charset="0"/>
-                  <a:cs typeface="Segoe UI Semibold" panose="020B0502040204020203" pitchFamily="34" charset="0"/>
+                <a:rPr lang="en-US" sz="1100" dirty="0">
+                  <a:latin typeface="Consolas" panose="020B0609020204030204" pitchFamily="49" charset="0"/>
+                  <a:cs typeface="Consolas" panose="020B0609020204030204" pitchFamily="49" charset="0"/>
                 </a:rPr>
-                <a:t>Azure</a:t>
-              </a:r>
-              <a:br>
-                <a:rPr lang="en-US" sz="900" b="1" dirty="0">
-                  <a:latin typeface="Segoe UI Semibold" panose="020B0502040204020203" pitchFamily="34" charset="0"/>
-                  <a:cs typeface="Segoe UI Semibold" panose="020B0502040204020203" pitchFamily="34" charset="0"/>
-                </a:rPr>
-              </a:br>
-              <a:r>
-                <a:rPr lang="en-US" sz="900" b="1" dirty="0">
-                  <a:latin typeface="Segoe UI Semibold" panose="020B0502040204020203" pitchFamily="34" charset="0"/>
-                  <a:cs typeface="Segoe UI Semibold" panose="020B0502040204020203" pitchFamily="34" charset="0"/>
-                </a:rPr>
-                <a:t>Container</a:t>
-              </a:r>
-              <a:br>
-                <a:rPr lang="en-US" sz="900" b="1" dirty="0">
-                  <a:latin typeface="Segoe UI Semibold" panose="020B0502040204020203" pitchFamily="34" charset="0"/>
-                  <a:cs typeface="Segoe UI Semibold" panose="020B0502040204020203" pitchFamily="34" charset="0"/>
-                </a:rPr>
-              </a:br>
-              <a:r>
-                <a:rPr lang="en-US" sz="900" b="1" dirty="0">
-                  <a:latin typeface="Segoe UI Semibold" panose="020B0502040204020203" pitchFamily="34" charset="0"/>
-                  <a:cs typeface="Segoe UI Semibold" panose="020B0502040204020203" pitchFamily="34" charset="0"/>
-                </a:rPr>
-                <a:t>Registry</a:t>
-              </a:r>
-              <a:br>
-                <a:rPr lang="en-US" sz="900" b="1" dirty="0">
-                  <a:latin typeface="Segoe UI Semibold" panose="020B0502040204020203" pitchFamily="34" charset="0"/>
-                  <a:cs typeface="Segoe UI Semibold" panose="020B0502040204020203" pitchFamily="34" charset="0"/>
-                </a:rPr>
-              </a:br>
-              <a:r>
-                <a:rPr lang="en-US" sz="900" b="1" i="1" dirty="0">
-                  <a:latin typeface="Segoe UI Semibold" panose="020B0502040204020203" pitchFamily="34" charset="0"/>
-                  <a:cs typeface="Segoe UI Semibold" panose="020B0502040204020203" pitchFamily="34" charset="0"/>
-                </a:rPr>
-                <a:t>Build</a:t>
+                <a:t>push</a:t>
               </a:r>
             </a:p>
           </p:txBody>
         </p:sp>
-        <p:pic>
-          <p:nvPicPr>
-            <p:cNvPr id="107" name="Graphic 106">
-              <a:extLst>
-                <a:ext uri="{FF2B5EF4-FFF2-40B4-BE49-F238E27FC236}">
-                  <a16:creationId xmlns:a16="http://schemas.microsoft.com/office/drawing/2014/main" id="{49ABBC64-C908-6343-A585-58EF136414FC}"/>
-                </a:ext>
-              </a:extLst>
-            </p:cNvPr>
-            <p:cNvPicPr>
-              <a:picLocks noChangeAspect="1"/>
-            </p:cNvPicPr>
-            <p:nvPr/>
-          </p:nvPicPr>
-          <p:blipFill>
-            <a:blip r:embed="rId14">
-              <a:extLst>
-                <a:ext uri="{96DAC541-7B7A-43D3-8B79-37D633B846F1}">
-                  <asvg:svgBlip xmlns:asvg="http://schemas.microsoft.com/office/drawing/2016/SVG/main" r:embed="rId15"/>
-                </a:ext>
-              </a:extLst>
-            </a:blip>
-            <a:stretch>
-              <a:fillRect/>
-            </a:stretch>
-          </p:blipFill>
-          <p:spPr>
-            <a:xfrm>
-              <a:off x="3381937" y="3294318"/>
-              <a:ext cx="506615" cy="506615"/>
-            </a:xfrm>
-            <a:prstGeom prst="rect">
-              <a:avLst/>
-            </a:prstGeom>
-          </p:spPr>
-        </p:pic>
-        <p:grpSp>
-          <p:nvGrpSpPr>
-            <p:cNvPr id="108" name="Group 107">
-              <a:extLst>
-                <a:ext uri="{FF2B5EF4-FFF2-40B4-BE49-F238E27FC236}">
-                  <a16:creationId xmlns:a16="http://schemas.microsoft.com/office/drawing/2014/main" id="{00494E7D-38C4-E542-95AE-8C334C71B9EF}"/>
-                </a:ext>
-              </a:extLst>
-            </p:cNvPr>
-            <p:cNvGrpSpPr/>
-            <p:nvPr/>
-          </p:nvGrpSpPr>
-          <p:grpSpPr>
-            <a:xfrm>
-              <a:off x="3922471" y="3624993"/>
-              <a:ext cx="885518" cy="290920"/>
-              <a:chOff x="3811742" y="1728592"/>
-              <a:chExt cx="885518" cy="290920"/>
-            </a:xfrm>
-          </p:grpSpPr>
-          <p:cxnSp>
-            <p:nvCxnSpPr>
-              <p:cNvPr id="109" name="Straight Arrow Connector 108">
-                <a:extLst>
-                  <a:ext uri="{FF2B5EF4-FFF2-40B4-BE49-F238E27FC236}">
-                    <a16:creationId xmlns:a16="http://schemas.microsoft.com/office/drawing/2014/main" id="{A729E330-6E69-8C47-B8F7-AE8D666A384D}"/>
-                  </a:ext>
-                </a:extLst>
-              </p:cNvPr>
-              <p:cNvCxnSpPr/>
-              <p:nvPr/>
-            </p:nvCxnSpPr>
-            <p:spPr>
-              <a:xfrm>
-                <a:off x="3811742" y="1728592"/>
-                <a:ext cx="885518" cy="0"/>
-              </a:xfrm>
-              <a:prstGeom prst="straightConnector1">
-                <a:avLst/>
-              </a:prstGeom>
-              <a:ln w="57150">
-                <a:solidFill>
-                  <a:schemeClr val="tx1"/>
-                </a:solidFill>
-                <a:headEnd type="triangle" w="med" len="sm"/>
-                <a:tailEnd type="triangle" w="med" len="sm"/>
-              </a:ln>
-            </p:spPr>
-            <p:style>
-              <a:lnRef idx="1">
-                <a:schemeClr val="accent1"/>
-              </a:lnRef>
-              <a:fillRef idx="0">
-                <a:schemeClr val="accent1"/>
-              </a:fillRef>
-              <a:effectRef idx="0">
-                <a:schemeClr val="accent1"/>
-              </a:effectRef>
-              <a:fontRef idx="minor">
-                <a:schemeClr val="tx1"/>
-              </a:fontRef>
-            </p:style>
-          </p:cxnSp>
-          <p:sp>
-            <p:nvSpPr>
-              <p:cNvPr id="110" name="Rectangle 109">
-                <a:extLst>
-                  <a:ext uri="{FF2B5EF4-FFF2-40B4-BE49-F238E27FC236}">
-                    <a16:creationId xmlns:a16="http://schemas.microsoft.com/office/drawing/2014/main" id="{4A1AB322-280C-F040-9565-9EE53263891F}"/>
-                  </a:ext>
-                </a:extLst>
-              </p:cNvPr>
-              <p:cNvSpPr/>
-              <p:nvPr/>
-            </p:nvSpPr>
-            <p:spPr>
-              <a:xfrm>
-                <a:off x="4008279" y="1757902"/>
-                <a:ext cx="492443" cy="261610"/>
-              </a:xfrm>
-              <a:prstGeom prst="rect">
-                <a:avLst/>
-              </a:prstGeom>
-            </p:spPr>
-            <p:txBody>
-              <a:bodyPr wrap="none">
-                <a:spAutoFit/>
-              </a:bodyPr>
-              <a:lstStyle/>
-              <a:p>
-                <a:pPr algn="ctr"/>
-                <a:r>
-                  <a:rPr lang="en-US" sz="1100" dirty="0">
-                    <a:latin typeface="Consolas" panose="020B0609020204030204" pitchFamily="49" charset="0"/>
-                    <a:cs typeface="Consolas" panose="020B0609020204030204" pitchFamily="49" charset="0"/>
-                  </a:rPr>
-                  <a:t>push</a:t>
-                </a:r>
-              </a:p>
-            </p:txBody>
-          </p:sp>
-        </p:grpSp>
         <p:grpSp>
           <p:nvGrpSpPr>
             <p:cNvPr id="111" name="Group 110">
@@ -5182,9 +5005,9 @@
           <p:grpSpPr>
             <a:xfrm>
               <a:off x="2478833" y="3624936"/>
-              <a:ext cx="885518" cy="798751"/>
+              <a:ext cx="2272707" cy="798751"/>
               <a:chOff x="3811742" y="1728592"/>
-              <a:chExt cx="885518" cy="798751"/>
+              <a:chExt cx="2272707" cy="798751"/>
             </a:xfrm>
           </p:grpSpPr>
           <p:cxnSp>
@@ -5196,13 +5019,15 @@
                   </a:ext>
                 </a:extLst>
               </p:cNvPr>
-              <p:cNvCxnSpPr/>
+              <p:cNvCxnSpPr>
+                <a:cxnSpLocks/>
+              </p:cNvCxnSpPr>
               <p:nvPr/>
             </p:nvCxnSpPr>
             <p:spPr>
               <a:xfrm>
                 <a:off x="3811742" y="1728592"/>
-                <a:ext cx="885518" cy="0"/>
+                <a:ext cx="2272707" cy="0"/>
               </a:xfrm>
               <a:prstGeom prst="straightConnector1">
                 <a:avLst/>
@@ -5390,7 +5215,7 @@
           </p:nvSpPr>
           <p:spPr>
             <a:xfrm>
-              <a:off x="3584500" y="3819790"/>
+              <a:off x="3125853" y="3819790"/>
               <a:ext cx="1643400" cy="215444"/>
             </a:xfrm>
             <a:prstGeom prst="rect">
@@ -5474,10 +5299,10 @@
             <p:nvPr/>
           </p:nvPicPr>
           <p:blipFill>
-            <a:blip r:embed="rId16">
+            <a:blip r:embed="rId14">
               <a:extLst>
                 <a:ext uri="{96DAC541-7B7A-43D3-8B79-37D633B846F1}">
-                  <asvg:svgBlip xmlns:asvg="http://schemas.microsoft.com/office/drawing/2016/SVG/main" r:embed="rId17"/>
+                  <asvg:svgBlip xmlns:asvg="http://schemas.microsoft.com/office/drawing/2016/SVG/main" r:embed="rId15"/>
                 </a:ext>
               </a:extLst>
             </a:blip>
@@ -5745,7 +5570,7 @@
               <p:nvPr/>
             </p:nvPicPr>
             <p:blipFill>
-              <a:blip r:embed="rId18"/>
+              <a:blip r:embed="rId16"/>
               <a:stretch>
                 <a:fillRect/>
               </a:stretch>
@@ -5956,7 +5781,7 @@
               <p:nvPr/>
             </p:nvPicPr>
             <p:blipFill>
-              <a:blip r:embed="rId19">
+              <a:blip r:embed="rId17">
                 <a:extLst>
                   <a:ext uri="{28A0092B-C50C-407E-A947-70E740481C1C}">
                     <a14:useLocalDpi xmlns:a14="http://schemas.microsoft.com/office/drawing/2010/main"/>
@@ -6864,10 +6689,10 @@
               <p:nvPr/>
             </p:nvPicPr>
             <p:blipFill>
-              <a:blip r:embed="rId16">
+              <a:blip r:embed="rId14">
                 <a:extLst>
                   <a:ext uri="{96DAC541-7B7A-43D3-8B79-37D633B846F1}">
-                    <asvg:svgBlip xmlns:asvg="http://schemas.microsoft.com/office/drawing/2016/SVG/main" r:embed="rId17"/>
+                    <asvg:svgBlip xmlns:asvg="http://schemas.microsoft.com/office/drawing/2016/SVG/main" r:embed="rId15"/>
                   </a:ext>
                 </a:extLst>
               </a:blip>
@@ -7015,10 +6840,10 @@
               <p:nvPr/>
             </p:nvPicPr>
             <p:blipFill>
-              <a:blip r:embed="rId20">
+              <a:blip r:embed="rId18">
                 <a:extLst>
                   <a:ext uri="{96DAC541-7B7A-43D3-8B79-37D633B846F1}">
-                    <asvg:svgBlip xmlns:asvg="http://schemas.microsoft.com/office/drawing/2016/SVG/main" r:embed="rId21"/>
+                    <asvg:svgBlip xmlns:asvg="http://schemas.microsoft.com/office/drawing/2016/SVG/main" r:embed="rId19"/>
                   </a:ext>
                 </a:extLst>
               </a:blip>
@@ -7051,7 +6876,7 @@
               <p:nvPr/>
             </p:nvPicPr>
             <p:blipFill>
-              <a:blip r:embed="rId22"/>
+              <a:blip r:embed="rId20"/>
               <a:stretch>
                 <a:fillRect/>
               </a:stretch>
@@ -7928,7 +7753,7 @@
             </p:blipFill>
             <p:spPr>
               <a:xfrm>
-                <a:off x="4175972" y="3162219"/>
+                <a:off x="3382363" y="3162219"/>
                 <a:ext cx="378514" cy="378514"/>
               </a:xfrm>
               <a:prstGeom prst="rect">
@@ -7974,10 +7799,10 @@
           </p:pic>
           <p:sp>
             <p:nvSpPr>
-              <p:cNvPr id="189" name="Rectangle 188">
+              <p:cNvPr id="193" name="Rectangle 192">
                 <a:extLst>
                   <a:ext uri="{FF2B5EF4-FFF2-40B4-BE49-F238E27FC236}">
-                    <a16:creationId xmlns:a16="http://schemas.microsoft.com/office/drawing/2014/main" id="{0B945238-2D43-2C4B-97C2-993A737CFF8C}"/>
+                    <a16:creationId xmlns:a16="http://schemas.microsoft.com/office/drawing/2014/main" id="{DAF5BE79-6A0B-7649-BBD4-980E54C2E1A0}"/>
                   </a:ext>
                 </a:extLst>
               </p:cNvPr>
@@ -7986,8 +7811,8 @@
             </p:nvSpPr>
             <p:spPr>
               <a:xfrm>
-                <a:off x="3286430" y="2555468"/>
-                <a:ext cx="697627" cy="646331"/>
+                <a:off x="3617344" y="3572721"/>
+                <a:ext cx="492443" cy="261610"/>
               </a:xfrm>
               <a:prstGeom prst="rect">
                 <a:avLst/>
@@ -8001,192 +7826,15 @@
               <a:p>
                 <a:pPr algn="ctr"/>
                 <a:r>
-                  <a:rPr lang="en-US" sz="900" b="1" dirty="0">
-                    <a:latin typeface="Segoe UI Semibold" panose="020B0502040204020203" pitchFamily="34" charset="0"/>
-                    <a:cs typeface="Segoe UI Semibold" panose="020B0502040204020203" pitchFamily="34" charset="0"/>
+                  <a:rPr lang="en-US" sz="1100" dirty="0">
+                    <a:latin typeface="Consolas" panose="020B0609020204030204" pitchFamily="49" charset="0"/>
+                    <a:cs typeface="Consolas" panose="020B0609020204030204" pitchFamily="49" charset="0"/>
                   </a:rPr>
-                  <a:t>Azure</a:t>
-                </a:r>
-                <a:br>
-                  <a:rPr lang="en-US" sz="900" b="1" dirty="0">
-                    <a:latin typeface="Segoe UI Semibold" panose="020B0502040204020203" pitchFamily="34" charset="0"/>
-                    <a:cs typeface="Segoe UI Semibold" panose="020B0502040204020203" pitchFamily="34" charset="0"/>
-                  </a:rPr>
-                </a:br>
-                <a:r>
-                  <a:rPr lang="en-US" sz="900" b="1" dirty="0">
-                    <a:latin typeface="Segoe UI Semibold" panose="020B0502040204020203" pitchFamily="34" charset="0"/>
-                    <a:cs typeface="Segoe UI Semibold" panose="020B0502040204020203" pitchFamily="34" charset="0"/>
-                  </a:rPr>
-                  <a:t>Container</a:t>
-                </a:r>
-                <a:br>
-                  <a:rPr lang="en-US" sz="900" b="1" dirty="0">
-                    <a:latin typeface="Segoe UI Semibold" panose="020B0502040204020203" pitchFamily="34" charset="0"/>
-                    <a:cs typeface="Segoe UI Semibold" panose="020B0502040204020203" pitchFamily="34" charset="0"/>
-                  </a:rPr>
-                </a:br>
-                <a:r>
-                  <a:rPr lang="en-US" sz="900" b="1" dirty="0">
-                    <a:latin typeface="Segoe UI Semibold" panose="020B0502040204020203" pitchFamily="34" charset="0"/>
-                    <a:cs typeface="Segoe UI Semibold" panose="020B0502040204020203" pitchFamily="34" charset="0"/>
-                  </a:rPr>
-                  <a:t>Registry</a:t>
-                </a:r>
-                <a:br>
-                  <a:rPr lang="en-US" sz="900" b="1" dirty="0">
-                    <a:latin typeface="Segoe UI Semibold" panose="020B0502040204020203" pitchFamily="34" charset="0"/>
-                    <a:cs typeface="Segoe UI Semibold" panose="020B0502040204020203" pitchFamily="34" charset="0"/>
-                  </a:rPr>
-                </a:br>
-                <a:r>
-                  <a:rPr lang="en-US" sz="900" b="1" i="1" dirty="0">
-                    <a:latin typeface="Segoe UI Semibold" panose="020B0502040204020203" pitchFamily="34" charset="0"/>
-                    <a:cs typeface="Segoe UI Semibold" panose="020B0502040204020203" pitchFamily="34" charset="0"/>
-                  </a:rPr>
-                  <a:t>Build</a:t>
+                  <a:t>push</a:t>
                 </a:r>
               </a:p>
             </p:txBody>
           </p:sp>
-          <p:pic>
-            <p:nvPicPr>
-              <p:cNvPr id="190" name="Graphic 189">
-                <a:extLst>
-                  <a:ext uri="{FF2B5EF4-FFF2-40B4-BE49-F238E27FC236}">
-                    <a16:creationId xmlns:a16="http://schemas.microsoft.com/office/drawing/2014/main" id="{3D297C25-84BA-BD44-B76A-F34F8EE8C8CC}"/>
-                  </a:ext>
-                </a:extLst>
-              </p:cNvPr>
-              <p:cNvPicPr>
-                <a:picLocks noChangeAspect="1"/>
-              </p:cNvPicPr>
-              <p:nvPr/>
-            </p:nvPicPr>
-            <p:blipFill>
-              <a:blip r:embed="rId10">
-                <a:extLst>
-                  <a:ext uri="{96DAC541-7B7A-43D3-8B79-37D633B846F1}">
-                    <asvg:svgBlip xmlns:asvg="http://schemas.microsoft.com/office/drawing/2016/SVG/main" r:embed="rId11"/>
-                  </a:ext>
-                </a:extLst>
-              </a:blip>
-              <a:stretch>
-                <a:fillRect/>
-              </a:stretch>
-            </p:blipFill>
-            <p:spPr>
-              <a:xfrm>
-                <a:off x="3381937" y="3212736"/>
-                <a:ext cx="506615" cy="506615"/>
-              </a:xfrm>
-              <a:prstGeom prst="rect">
-                <a:avLst/>
-              </a:prstGeom>
-            </p:spPr>
-          </p:pic>
-          <p:grpSp>
-            <p:nvGrpSpPr>
-              <p:cNvPr id="191" name="Group 190">
-                <a:extLst>
-                  <a:ext uri="{FF2B5EF4-FFF2-40B4-BE49-F238E27FC236}">
-                    <a16:creationId xmlns:a16="http://schemas.microsoft.com/office/drawing/2014/main" id="{1AC6E7A5-EAB4-AA4B-BE00-5D47A87E9BB7}"/>
-                  </a:ext>
-                </a:extLst>
-              </p:cNvPr>
-              <p:cNvGrpSpPr/>
-              <p:nvPr/>
-            </p:nvGrpSpPr>
-            <p:grpSpPr>
-              <a:xfrm>
-                <a:off x="3922471" y="3543411"/>
-                <a:ext cx="885518" cy="290920"/>
-                <a:chOff x="3811742" y="1728592"/>
-                <a:chExt cx="885518" cy="290920"/>
-              </a:xfrm>
-            </p:grpSpPr>
-            <p:cxnSp>
-              <p:nvCxnSpPr>
-                <p:cNvPr id="192" name="Straight Arrow Connector 191">
-                  <a:extLst>
-                    <a:ext uri="{FF2B5EF4-FFF2-40B4-BE49-F238E27FC236}">
-                      <a16:creationId xmlns:a16="http://schemas.microsoft.com/office/drawing/2014/main" id="{606AD64A-692A-9348-A017-6C515B2EB54D}"/>
-                    </a:ext>
-                  </a:extLst>
-                </p:cNvPr>
-                <p:cNvCxnSpPr/>
-                <p:nvPr/>
-              </p:nvCxnSpPr>
-              <p:spPr>
-                <a:xfrm>
-                  <a:off x="3811742" y="1728592"/>
-                  <a:ext cx="885518" cy="0"/>
-                </a:xfrm>
-                <a:prstGeom prst="straightConnector1">
-                  <a:avLst/>
-                </a:prstGeom>
-                <a:ln w="57150">
-                  <a:solidFill>
-                    <a:schemeClr val="tx1"/>
-                  </a:solidFill>
-                  <a:headEnd type="triangle" w="med" len="sm"/>
-                  <a:tailEnd type="triangle" w="med" len="sm"/>
-                </a:ln>
-              </p:spPr>
-              <p:style>
-                <a:lnRef idx="1">
-                  <a:schemeClr val="accent1"/>
-                </a:lnRef>
-                <a:fillRef idx="0">
-                  <a:schemeClr val="accent1"/>
-                </a:fillRef>
-                <a:effectRef idx="0">
-                  <a:schemeClr val="accent1"/>
-                </a:effectRef>
-                <a:fontRef idx="minor">
-                  <a:schemeClr val="tx1"/>
-                </a:fontRef>
-              </p:style>
-            </p:cxnSp>
-            <p:sp>
-              <p:nvSpPr>
-                <p:cNvPr id="193" name="Rectangle 192">
-                  <a:extLst>
-                    <a:ext uri="{FF2B5EF4-FFF2-40B4-BE49-F238E27FC236}">
-                      <a16:creationId xmlns:a16="http://schemas.microsoft.com/office/drawing/2014/main" id="{DAF5BE79-6A0B-7649-BBD4-980E54C2E1A0}"/>
-                    </a:ext>
-                  </a:extLst>
-                </p:cNvPr>
-                <p:cNvSpPr/>
-                <p:nvPr/>
-              </p:nvSpPr>
-              <p:spPr>
-                <a:xfrm>
-                  <a:off x="4008279" y="1757902"/>
-                  <a:ext cx="492443" cy="261610"/>
-                </a:xfrm>
-                <a:prstGeom prst="rect">
-                  <a:avLst/>
-                </a:prstGeom>
-              </p:spPr>
-              <p:txBody>
-                <a:bodyPr wrap="none">
-                  <a:spAutoFit/>
-                </a:bodyPr>
-                <a:lstStyle/>
-                <a:p>
-                  <a:pPr algn="ctr"/>
-                  <a:r>
-                    <a:rPr lang="en-US" sz="1100" dirty="0">
-                      <a:latin typeface="Consolas" panose="020B0609020204030204" pitchFamily="49" charset="0"/>
-                      <a:cs typeface="Consolas" panose="020B0609020204030204" pitchFamily="49" charset="0"/>
-                    </a:rPr>
-                    <a:t>push</a:t>
-                  </a:r>
-                </a:p>
-              </p:txBody>
-            </p:sp>
-          </p:grpSp>
           <p:grpSp>
             <p:nvGrpSpPr>
               <p:cNvPr id="194" name="Group 193">
@@ -8202,9 +7850,9 @@
             <p:grpSpPr>
               <a:xfrm>
                 <a:off x="2478833" y="3543354"/>
-                <a:ext cx="885518" cy="798751"/>
+                <a:ext cx="2272707" cy="798751"/>
                 <a:chOff x="3811742" y="1728592"/>
-                <a:chExt cx="885518" cy="798751"/>
+                <a:chExt cx="2272707" cy="798751"/>
               </a:xfrm>
             </p:grpSpPr>
             <p:cxnSp>
@@ -8216,13 +7864,15 @@
                     </a:ext>
                   </a:extLst>
                 </p:cNvPr>
-                <p:cNvCxnSpPr/>
+                <p:cNvCxnSpPr>
+                  <a:cxnSpLocks/>
+                </p:cNvCxnSpPr>
                 <p:nvPr/>
               </p:nvCxnSpPr>
               <p:spPr>
                 <a:xfrm>
                   <a:off x="3811742" y="1728592"/>
-                  <a:ext cx="885518" cy="0"/>
+                  <a:ext cx="2272707" cy="0"/>
                 </a:xfrm>
                 <a:prstGeom prst="straightConnector1">
                   <a:avLst/>
@@ -8410,7 +8060,7 @@
             </p:nvSpPr>
             <p:spPr>
               <a:xfrm>
-                <a:off x="3556448" y="3738208"/>
+                <a:off x="3054784" y="3738208"/>
                 <a:ext cx="1699504" cy="215444"/>
               </a:xfrm>
               <a:prstGeom prst="rect">
@@ -8456,10 +8106,10 @@
               <p:nvPr/>
             </p:nvPicPr>
             <p:blipFill>
-              <a:blip r:embed="rId12">
+              <a:blip r:embed="rId10">
                 <a:extLst>
                   <a:ext uri="{96DAC541-7B7A-43D3-8B79-37D633B846F1}">
-                    <asvg:svgBlip xmlns:asvg="http://schemas.microsoft.com/office/drawing/2016/SVG/main" r:embed="rId13"/>
+                    <asvg:svgBlip xmlns:asvg="http://schemas.microsoft.com/office/drawing/2016/SVG/main" r:embed="rId11"/>
                   </a:ext>
                 </a:extLst>
               </a:blip>
@@ -8876,10 +8526,10 @@
           <p:nvPr/>
         </p:nvPicPr>
         <p:blipFill>
-          <a:blip r:embed="rId14">
+          <a:blip r:embed="rId12">
             <a:extLst>
               <a:ext uri="{96DAC541-7B7A-43D3-8B79-37D633B846F1}">
-                <asvg:svgBlip xmlns:asvg="http://schemas.microsoft.com/office/drawing/2016/SVG/main" r:embed="rId15"/>
+                <asvg:svgBlip xmlns:asvg="http://schemas.microsoft.com/office/drawing/2016/SVG/main" r:embed="rId13"/>
               </a:ext>
             </a:extLst>
           </a:blip>
@@ -8964,10 +8614,10 @@
           <p:nvPr/>
         </p:nvPicPr>
         <p:blipFill>
-          <a:blip r:embed="rId16">
+          <a:blip r:embed="rId14">
             <a:extLst>
               <a:ext uri="{96DAC541-7B7A-43D3-8B79-37D633B846F1}">
-                <asvg:svgBlip xmlns:asvg="http://schemas.microsoft.com/office/drawing/2016/SVG/main" r:embed="rId17"/>
+                <asvg:svgBlip xmlns:asvg="http://schemas.microsoft.com/office/drawing/2016/SVG/main" r:embed="rId15"/>
               </a:ext>
             </a:extLst>
           </a:blip>
@@ -9038,10 +8688,10 @@
           <p:nvPr/>
         </p:nvPicPr>
         <p:blipFill>
-          <a:blip r:embed="rId14">
+          <a:blip r:embed="rId12">
             <a:extLst>
               <a:ext uri="{96DAC541-7B7A-43D3-8B79-37D633B846F1}">
-                <asvg:svgBlip xmlns:asvg="http://schemas.microsoft.com/office/drawing/2016/SVG/main" r:embed="rId15"/>
+                <asvg:svgBlip xmlns:asvg="http://schemas.microsoft.com/office/drawing/2016/SVG/main" r:embed="rId13"/>
               </a:ext>
             </a:extLst>
           </a:blip>
@@ -9395,10 +9045,10 @@
           <p:nvPr/>
         </p:nvPicPr>
         <p:blipFill>
-          <a:blip r:embed="rId18">
+          <a:blip r:embed="rId16">
             <a:extLst>
               <a:ext uri="{96DAC541-7B7A-43D3-8B79-37D633B846F1}">
-                <asvg:svgBlip xmlns:asvg="http://schemas.microsoft.com/office/drawing/2016/SVG/main" r:embed="rId19"/>
+                <asvg:svgBlip xmlns:asvg="http://schemas.microsoft.com/office/drawing/2016/SVG/main" r:embed="rId17"/>
               </a:ext>
             </a:extLst>
           </a:blip>
@@ -9749,10 +9399,10 @@
               <p:nvPr/>
             </p:nvPicPr>
             <p:blipFill>
-              <a:blip r:embed="rId12">
+              <a:blip r:embed="rId10">
                 <a:extLst>
                   <a:ext uri="{96DAC541-7B7A-43D3-8B79-37D633B846F1}">
-                    <asvg:svgBlip xmlns:asvg="http://schemas.microsoft.com/office/drawing/2016/SVG/main" r:embed="rId13"/>
+                    <asvg:svgBlip xmlns:asvg="http://schemas.microsoft.com/office/drawing/2016/SVG/main" r:embed="rId11"/>
                   </a:ext>
                 </a:extLst>
               </a:blip>
@@ -9900,10 +9550,10 @@
               <p:nvPr/>
             </p:nvPicPr>
             <p:blipFill>
-              <a:blip r:embed="rId20">
+              <a:blip r:embed="rId18">
                 <a:extLst>
                   <a:ext uri="{96DAC541-7B7A-43D3-8B79-37D633B846F1}">
-                    <asvg:svgBlip xmlns:asvg="http://schemas.microsoft.com/office/drawing/2016/SVG/main" r:embed="rId21"/>
+                    <asvg:svgBlip xmlns:asvg="http://schemas.microsoft.com/office/drawing/2016/SVG/main" r:embed="rId19"/>
                   </a:ext>
                 </a:extLst>
               </a:blip>
@@ -9936,7 +9586,7 @@
               <p:nvPr/>
             </p:nvPicPr>
             <p:blipFill>
-              <a:blip r:embed="rId22"/>
+              <a:blip r:embed="rId20"/>
               <a:stretch>
                 <a:fillRect/>
               </a:stretch>
@@ -10683,7 +10333,7 @@
           </p:blipFill>
           <p:spPr>
             <a:xfrm>
-              <a:off x="4175972" y="2199716"/>
+              <a:off x="3442847" y="2199716"/>
               <a:ext cx="378514" cy="378514"/>
             </a:xfrm>
             <a:prstGeom prst="rect">
@@ -10729,10 +10379,10 @@
         </p:pic>
         <p:sp>
           <p:nvSpPr>
-            <p:cNvPr id="189" name="Rectangle 188">
+            <p:cNvPr id="193" name="Rectangle 192">
               <a:extLst>
                 <a:ext uri="{FF2B5EF4-FFF2-40B4-BE49-F238E27FC236}">
-                  <a16:creationId xmlns:a16="http://schemas.microsoft.com/office/drawing/2014/main" id="{0B945238-2D43-2C4B-97C2-993A737CFF8C}"/>
+                  <a16:creationId xmlns:a16="http://schemas.microsoft.com/office/drawing/2014/main" id="{DAF5BE79-6A0B-7649-BBD4-980E54C2E1A0}"/>
                 </a:ext>
               </a:extLst>
             </p:cNvPr>
@@ -10741,8 +10391,8 @@
           </p:nvSpPr>
           <p:spPr>
             <a:xfrm>
-              <a:off x="3286430" y="1592965"/>
-              <a:ext cx="697627" cy="646331"/>
+              <a:off x="3641709" y="2610218"/>
+              <a:ext cx="492443" cy="261610"/>
             </a:xfrm>
             <a:prstGeom prst="rect">
               <a:avLst/>
@@ -10756,192 +10406,15 @@
             <a:p>
               <a:pPr algn="ctr"/>
               <a:r>
-                <a:rPr lang="en-US" sz="900" b="1" dirty="0">
-                  <a:latin typeface="Segoe UI Semibold" panose="020B0502040204020203" pitchFamily="34" charset="0"/>
-                  <a:cs typeface="Segoe UI Semibold" panose="020B0502040204020203" pitchFamily="34" charset="0"/>
+                <a:rPr lang="en-US" sz="1100" dirty="0">
+                  <a:latin typeface="Consolas" panose="020B0609020204030204" pitchFamily="49" charset="0"/>
+                  <a:cs typeface="Consolas" panose="020B0609020204030204" pitchFamily="49" charset="0"/>
                 </a:rPr>
-                <a:t>Azure</a:t>
-              </a:r>
-              <a:br>
-                <a:rPr lang="en-US" sz="900" b="1" dirty="0">
-                  <a:latin typeface="Segoe UI Semibold" panose="020B0502040204020203" pitchFamily="34" charset="0"/>
-                  <a:cs typeface="Segoe UI Semibold" panose="020B0502040204020203" pitchFamily="34" charset="0"/>
-                </a:rPr>
-              </a:br>
-              <a:r>
-                <a:rPr lang="en-US" sz="900" b="1" dirty="0">
-                  <a:latin typeface="Segoe UI Semibold" panose="020B0502040204020203" pitchFamily="34" charset="0"/>
-                  <a:cs typeface="Segoe UI Semibold" panose="020B0502040204020203" pitchFamily="34" charset="0"/>
-                </a:rPr>
-                <a:t>Container</a:t>
-              </a:r>
-              <a:br>
-                <a:rPr lang="en-US" sz="900" b="1" dirty="0">
-                  <a:latin typeface="Segoe UI Semibold" panose="020B0502040204020203" pitchFamily="34" charset="0"/>
-                  <a:cs typeface="Segoe UI Semibold" panose="020B0502040204020203" pitchFamily="34" charset="0"/>
-                </a:rPr>
-              </a:br>
-              <a:r>
-                <a:rPr lang="en-US" sz="900" b="1" dirty="0">
-                  <a:latin typeface="Segoe UI Semibold" panose="020B0502040204020203" pitchFamily="34" charset="0"/>
-                  <a:cs typeface="Segoe UI Semibold" panose="020B0502040204020203" pitchFamily="34" charset="0"/>
-                </a:rPr>
-                <a:t>Registry</a:t>
-              </a:r>
-              <a:br>
-                <a:rPr lang="en-US" sz="900" b="1" dirty="0">
-                  <a:latin typeface="Segoe UI Semibold" panose="020B0502040204020203" pitchFamily="34" charset="0"/>
-                  <a:cs typeface="Segoe UI Semibold" panose="020B0502040204020203" pitchFamily="34" charset="0"/>
-                </a:rPr>
-              </a:br>
-              <a:r>
-                <a:rPr lang="en-US" sz="900" b="1" i="1" dirty="0">
-                  <a:latin typeface="Segoe UI Semibold" panose="020B0502040204020203" pitchFamily="34" charset="0"/>
-                  <a:cs typeface="Segoe UI Semibold" panose="020B0502040204020203" pitchFamily="34" charset="0"/>
-                </a:rPr>
-                <a:t>Build</a:t>
+                <a:t>push</a:t>
               </a:r>
             </a:p>
           </p:txBody>
         </p:sp>
-        <p:pic>
-          <p:nvPicPr>
-            <p:cNvPr id="190" name="Graphic 189">
-              <a:extLst>
-                <a:ext uri="{FF2B5EF4-FFF2-40B4-BE49-F238E27FC236}">
-                  <a16:creationId xmlns:a16="http://schemas.microsoft.com/office/drawing/2014/main" id="{3D297C25-84BA-BD44-B76A-F34F8EE8C8CC}"/>
-                </a:ext>
-              </a:extLst>
-            </p:cNvPr>
-            <p:cNvPicPr>
-              <a:picLocks noChangeAspect="1"/>
-            </p:cNvPicPr>
-            <p:nvPr/>
-          </p:nvPicPr>
-          <p:blipFill>
-            <a:blip r:embed="rId10">
-              <a:extLst>
-                <a:ext uri="{96DAC541-7B7A-43D3-8B79-37D633B846F1}">
-                  <asvg:svgBlip xmlns:asvg="http://schemas.microsoft.com/office/drawing/2016/SVG/main" r:embed="rId11"/>
-                </a:ext>
-              </a:extLst>
-            </a:blip>
-            <a:stretch>
-              <a:fillRect/>
-            </a:stretch>
-          </p:blipFill>
-          <p:spPr>
-            <a:xfrm>
-              <a:off x="3381937" y="2250233"/>
-              <a:ext cx="506615" cy="506615"/>
-            </a:xfrm>
-            <a:prstGeom prst="rect">
-              <a:avLst/>
-            </a:prstGeom>
-          </p:spPr>
-        </p:pic>
-        <p:grpSp>
-          <p:nvGrpSpPr>
-            <p:cNvPr id="191" name="Group 190">
-              <a:extLst>
-                <a:ext uri="{FF2B5EF4-FFF2-40B4-BE49-F238E27FC236}">
-                  <a16:creationId xmlns:a16="http://schemas.microsoft.com/office/drawing/2014/main" id="{1AC6E7A5-EAB4-AA4B-BE00-5D47A87E9BB7}"/>
-                </a:ext>
-              </a:extLst>
-            </p:cNvPr>
-            <p:cNvGrpSpPr/>
-            <p:nvPr/>
-          </p:nvGrpSpPr>
-          <p:grpSpPr>
-            <a:xfrm>
-              <a:off x="3922471" y="2580908"/>
-              <a:ext cx="885518" cy="290920"/>
-              <a:chOff x="3811742" y="1728592"/>
-              <a:chExt cx="885518" cy="290920"/>
-            </a:xfrm>
-          </p:grpSpPr>
-          <p:cxnSp>
-            <p:nvCxnSpPr>
-              <p:cNvPr id="192" name="Straight Arrow Connector 191">
-                <a:extLst>
-                  <a:ext uri="{FF2B5EF4-FFF2-40B4-BE49-F238E27FC236}">
-                    <a16:creationId xmlns:a16="http://schemas.microsoft.com/office/drawing/2014/main" id="{606AD64A-692A-9348-A017-6C515B2EB54D}"/>
-                  </a:ext>
-                </a:extLst>
-              </p:cNvPr>
-              <p:cNvCxnSpPr/>
-              <p:nvPr/>
-            </p:nvCxnSpPr>
-            <p:spPr>
-              <a:xfrm>
-                <a:off x="3811742" y="1728592"/>
-                <a:ext cx="885518" cy="0"/>
-              </a:xfrm>
-              <a:prstGeom prst="straightConnector1">
-                <a:avLst/>
-              </a:prstGeom>
-              <a:ln w="57150">
-                <a:solidFill>
-                  <a:schemeClr val="tx1"/>
-                </a:solidFill>
-                <a:headEnd type="triangle" w="med" len="sm"/>
-                <a:tailEnd type="triangle" w="med" len="sm"/>
-              </a:ln>
-            </p:spPr>
-            <p:style>
-              <a:lnRef idx="1">
-                <a:schemeClr val="accent1"/>
-              </a:lnRef>
-              <a:fillRef idx="0">
-                <a:schemeClr val="accent1"/>
-              </a:fillRef>
-              <a:effectRef idx="0">
-                <a:schemeClr val="accent1"/>
-              </a:effectRef>
-              <a:fontRef idx="minor">
-                <a:schemeClr val="tx1"/>
-              </a:fontRef>
-            </p:style>
-          </p:cxnSp>
-          <p:sp>
-            <p:nvSpPr>
-              <p:cNvPr id="193" name="Rectangle 192">
-                <a:extLst>
-                  <a:ext uri="{FF2B5EF4-FFF2-40B4-BE49-F238E27FC236}">
-                    <a16:creationId xmlns:a16="http://schemas.microsoft.com/office/drawing/2014/main" id="{DAF5BE79-6A0B-7649-BBD4-980E54C2E1A0}"/>
-                  </a:ext>
-                </a:extLst>
-              </p:cNvPr>
-              <p:cNvSpPr/>
-              <p:nvPr/>
-            </p:nvSpPr>
-            <p:spPr>
-              <a:xfrm>
-                <a:off x="4008279" y="1757902"/>
-                <a:ext cx="492443" cy="261610"/>
-              </a:xfrm>
-              <a:prstGeom prst="rect">
-                <a:avLst/>
-              </a:prstGeom>
-            </p:spPr>
-            <p:txBody>
-              <a:bodyPr wrap="none">
-                <a:spAutoFit/>
-              </a:bodyPr>
-              <a:lstStyle/>
-              <a:p>
-                <a:pPr algn="ctr"/>
-                <a:r>
-                  <a:rPr lang="en-US" sz="1100" dirty="0">
-                    <a:latin typeface="Consolas" panose="020B0609020204030204" pitchFamily="49" charset="0"/>
-                    <a:cs typeface="Consolas" panose="020B0609020204030204" pitchFamily="49" charset="0"/>
-                  </a:rPr>
-                  <a:t>push</a:t>
-                </a:r>
-              </a:p>
-            </p:txBody>
-          </p:sp>
-        </p:grpSp>
         <p:grpSp>
           <p:nvGrpSpPr>
             <p:cNvPr id="194" name="Group 193">
@@ -10957,9 +10430,9 @@
           <p:grpSpPr>
             <a:xfrm>
               <a:off x="2478833" y="2580851"/>
-              <a:ext cx="885518" cy="798751"/>
+              <a:ext cx="2279332" cy="798751"/>
               <a:chOff x="3811742" y="1728592"/>
-              <a:chExt cx="885518" cy="798751"/>
+              <a:chExt cx="2279332" cy="798751"/>
             </a:xfrm>
           </p:grpSpPr>
           <p:cxnSp>
@@ -10971,13 +10444,15 @@
                   </a:ext>
                 </a:extLst>
               </p:cNvPr>
-              <p:cNvCxnSpPr/>
+              <p:cNvCxnSpPr>
+                <a:cxnSpLocks/>
+              </p:cNvCxnSpPr>
               <p:nvPr/>
             </p:nvCxnSpPr>
             <p:spPr>
               <a:xfrm>
                 <a:off x="3811742" y="1728592"/>
-                <a:ext cx="885518" cy="0"/>
+                <a:ext cx="2279332" cy="0"/>
               </a:xfrm>
               <a:prstGeom prst="straightConnector1">
                 <a:avLst/>
@@ -11165,7 +10640,7 @@
           </p:nvSpPr>
           <p:spPr>
             <a:xfrm>
-              <a:off x="3668658" y="2775705"/>
+              <a:off x="3191359" y="2775705"/>
               <a:ext cx="1475083" cy="215444"/>
             </a:xfrm>
             <a:prstGeom prst="rect">
@@ -11204,10 +10679,10 @@
             <p:nvPr/>
           </p:nvPicPr>
           <p:blipFill>
-            <a:blip r:embed="rId12">
+            <a:blip r:embed="rId10">
               <a:extLst>
                 <a:ext uri="{96DAC541-7B7A-43D3-8B79-37D633B846F1}">
-                  <asvg:svgBlip xmlns:asvg="http://schemas.microsoft.com/office/drawing/2016/SVG/main" r:embed="rId13"/>
+                  <asvg:svgBlip xmlns:asvg="http://schemas.microsoft.com/office/drawing/2016/SVG/main" r:embed="rId11"/>
                 </a:ext>
               </a:extLst>
             </a:blip>
@@ -11711,10 +11186,10 @@
               <p:nvPr/>
             </p:nvPicPr>
             <p:blipFill>
-              <a:blip r:embed="rId12">
+              <a:blip r:embed="rId10">
                 <a:extLst>
                   <a:ext uri="{96DAC541-7B7A-43D3-8B79-37D633B846F1}">
-                    <asvg:svgBlip xmlns:asvg="http://schemas.microsoft.com/office/drawing/2016/SVG/main" r:embed="rId13"/>
+                    <asvg:svgBlip xmlns:asvg="http://schemas.microsoft.com/office/drawing/2016/SVG/main" r:embed="rId11"/>
                   </a:ext>
                 </a:extLst>
               </a:blip>
@@ -11862,10 +11337,10 @@
               <p:nvPr/>
             </p:nvPicPr>
             <p:blipFill>
-              <a:blip r:embed="rId14">
+              <a:blip r:embed="rId12">
                 <a:extLst>
                   <a:ext uri="{96DAC541-7B7A-43D3-8B79-37D633B846F1}">
-                    <asvg:svgBlip xmlns:asvg="http://schemas.microsoft.com/office/drawing/2016/SVG/main" r:embed="rId15"/>
+                    <asvg:svgBlip xmlns:asvg="http://schemas.microsoft.com/office/drawing/2016/SVG/main" r:embed="rId13"/>
                   </a:ext>
                 </a:extLst>
               </a:blip>
@@ -11898,7 +11373,7 @@
               <p:nvPr/>
             </p:nvPicPr>
             <p:blipFill>
-              <a:blip r:embed="rId16"/>
+              <a:blip r:embed="rId14"/>
               <a:stretch>
                 <a:fillRect/>
               </a:stretch>
@@ -12145,10 +11620,10 @@
           <p:nvPr/>
         </p:nvPicPr>
         <p:blipFill>
-          <a:blip r:embed="rId17">
+          <a:blip r:embed="rId15">
             <a:extLst>
               <a:ext uri="{96DAC541-7B7A-43D3-8B79-37D633B846F1}">
-                <asvg:svgBlip xmlns:asvg="http://schemas.microsoft.com/office/drawing/2016/SVG/main" r:embed="rId18"/>
+                <asvg:svgBlip xmlns:asvg="http://schemas.microsoft.com/office/drawing/2016/SVG/main" r:embed="rId16"/>
               </a:ext>
             </a:extLst>
           </a:blip>
@@ -12233,10 +11708,10 @@
           <p:nvPr/>
         </p:nvPicPr>
         <p:blipFill>
-          <a:blip r:embed="rId19">
+          <a:blip r:embed="rId17">
             <a:extLst>
               <a:ext uri="{96DAC541-7B7A-43D3-8B79-37D633B846F1}">
-                <asvg:svgBlip xmlns:asvg="http://schemas.microsoft.com/office/drawing/2016/SVG/main" r:embed="rId20"/>
+                <asvg:svgBlip xmlns:asvg="http://schemas.microsoft.com/office/drawing/2016/SVG/main" r:embed="rId18"/>
               </a:ext>
             </a:extLst>
           </a:blip>
@@ -12307,10 +11782,10 @@
           <p:nvPr/>
         </p:nvPicPr>
         <p:blipFill>
-          <a:blip r:embed="rId17">
+          <a:blip r:embed="rId15">
             <a:extLst>
               <a:ext uri="{96DAC541-7B7A-43D3-8B79-37D633B846F1}">
-                <asvg:svgBlip xmlns:asvg="http://schemas.microsoft.com/office/drawing/2016/SVG/main" r:embed="rId18"/>
+                <asvg:svgBlip xmlns:asvg="http://schemas.microsoft.com/office/drawing/2016/SVG/main" r:embed="rId16"/>
               </a:ext>
             </a:extLst>
           </a:blip>
@@ -12664,10 +12139,10 @@
           <p:nvPr/>
         </p:nvPicPr>
         <p:blipFill>
-          <a:blip r:embed="rId21">
+          <a:blip r:embed="rId19">
             <a:extLst>
               <a:ext uri="{96DAC541-7B7A-43D3-8B79-37D633B846F1}">
-                <asvg:svgBlip xmlns:asvg="http://schemas.microsoft.com/office/drawing/2016/SVG/main" r:embed="rId22"/>
+                <asvg:svgBlip xmlns:asvg="http://schemas.microsoft.com/office/drawing/2016/SVG/main" r:embed="rId20"/>
               </a:ext>
             </a:extLst>
           </a:blip>
@@ -12946,10 +12421,10 @@
               <p:nvPr/>
             </p:nvPicPr>
             <p:blipFill>
-              <a:blip r:embed="rId12">
+              <a:blip r:embed="rId10">
                 <a:extLst>
                   <a:ext uri="{96DAC541-7B7A-43D3-8B79-37D633B846F1}">
-                    <asvg:svgBlip xmlns:asvg="http://schemas.microsoft.com/office/drawing/2016/SVG/main" r:embed="rId13"/>
+                    <asvg:svgBlip xmlns:asvg="http://schemas.microsoft.com/office/drawing/2016/SVG/main" r:embed="rId11"/>
                   </a:ext>
                 </a:extLst>
               </a:blip>
@@ -13097,10 +12572,10 @@
               <p:nvPr/>
             </p:nvPicPr>
             <p:blipFill>
-              <a:blip r:embed="rId14">
+              <a:blip r:embed="rId12">
                 <a:extLst>
                   <a:ext uri="{96DAC541-7B7A-43D3-8B79-37D633B846F1}">
-                    <asvg:svgBlip xmlns:asvg="http://schemas.microsoft.com/office/drawing/2016/SVG/main" r:embed="rId15"/>
+                    <asvg:svgBlip xmlns:asvg="http://schemas.microsoft.com/office/drawing/2016/SVG/main" r:embed="rId13"/>
                   </a:ext>
                 </a:extLst>
               </a:blip>
@@ -13133,7 +12608,7 @@
               <p:nvPr/>
             </p:nvPicPr>
             <p:blipFill>
-              <a:blip r:embed="rId16"/>
+              <a:blip r:embed="rId14"/>
               <a:stretch>
                 <a:fillRect/>
               </a:stretch>
@@ -13469,10 +12944,10 @@
               <p:nvPr/>
             </p:nvPicPr>
             <p:blipFill>
-              <a:blip r:embed="rId12">
+              <a:blip r:embed="rId10">
                 <a:extLst>
                   <a:ext uri="{96DAC541-7B7A-43D3-8B79-37D633B846F1}">
-                    <asvg:svgBlip xmlns:asvg="http://schemas.microsoft.com/office/drawing/2016/SVG/main" r:embed="rId13"/>
+                    <asvg:svgBlip xmlns:asvg="http://schemas.microsoft.com/office/drawing/2016/SVG/main" r:embed="rId11"/>
                   </a:ext>
                 </a:extLst>
               </a:blip>
@@ -13620,10 +13095,10 @@
               <p:nvPr/>
             </p:nvPicPr>
             <p:blipFill>
-              <a:blip r:embed="rId14">
+              <a:blip r:embed="rId12">
                 <a:extLst>
                   <a:ext uri="{96DAC541-7B7A-43D3-8B79-37D633B846F1}">
-                    <asvg:svgBlip xmlns:asvg="http://schemas.microsoft.com/office/drawing/2016/SVG/main" r:embed="rId15"/>
+                    <asvg:svgBlip xmlns:asvg="http://schemas.microsoft.com/office/drawing/2016/SVG/main" r:embed="rId13"/>
                   </a:ext>
                 </a:extLst>
               </a:blip>
@@ -13656,7 +13131,7 @@
               <p:nvPr/>
             </p:nvPicPr>
             <p:blipFill>
-              <a:blip r:embed="rId16"/>
+              <a:blip r:embed="rId14"/>
               <a:stretch>
                 <a:fillRect/>
               </a:stretch>

</xml_diff>